<commit_message>
change order in outline
</commit_message>
<xml_diff>
--- a/assets/presentation.pptx
+++ b/assets/presentation.pptx
@@ -3599,13 +3599,13 @@
           <a:p>
             <a:pPr/>
             <a:r>
+              <a:t>Probleemstelling</a:t>
+            </a:r>
+          </a:p>
+          <a:p>
+            <a:pPr/>
+            <a:r>
               <a:t>Demo</a:t>
-            </a:r>
-          </a:p>
-          <a:p>
-            <a:pPr/>
-            <a:r>
-              <a:t>Probleemstelling</a:t>
             </a:r>
           </a:p>
           <a:p>

</xml_diff>

<commit_message>
fix capital letters xxx
</commit_message>
<xml_diff>
--- a/assets/presentation.pptx
+++ b/assets/presentation.pptx
@@ -3747,25 +3747,25 @@
           <a:p>
             <a:pPr/>
             <a:r>
-              <a:t>onthouden</a:t>
-            </a:r>
-          </a:p>
-          <a:p>
-            <a:pPr/>
-            <a:r>
-              <a:t>opschrijven</a:t>
-            </a:r>
-          </a:p>
-          <a:p>
-            <a:pPr/>
-            <a:r>
-              <a:t>locatie</a:t>
-            </a:r>
-          </a:p>
-          <a:p>
-            <a:pPr/>
-            <a:r>
-              <a:t>directe info</a:t>
+              <a:t>Onthouden</a:t>
+            </a:r>
+          </a:p>
+          <a:p>
+            <a:pPr/>
+            <a:r>
+              <a:t>Opschrijven</a:t>
+            </a:r>
+          </a:p>
+          <a:p>
+            <a:pPr/>
+            <a:r>
+              <a:t>Locatie</a:t>
+            </a:r>
+          </a:p>
+          <a:p>
+            <a:pPr/>
+            <a:r>
+              <a:t>Directe info</a:t>
             </a:r>
           </a:p>
         </p:txBody>
@@ -4005,7 +4005,7 @@
           <a:p>
             <a:pPr/>
             <a:r>
-              <a:t>kilometervergoeding</a:t>
+              <a:t>Kilometervergoeding</a:t>
             </a:r>
           </a:p>
         </p:txBody>
@@ -4055,7 +4055,7 @@
           <a:p>
             <a:pPr/>
             <a:r>
-              <a:t>vragen</a:t>
+              <a:t>Vragen</a:t>
             </a:r>
           </a:p>
         </p:txBody>

</xml_diff>